<commit_message>
escopo do site em html/css puro sem react
vou primeiro criar o site em html css e passar para react apenas depois
</commit_message>
<xml_diff>
--- a/Documentação/Grupo 3 - Status Report 16-09.pptx
+++ b/Documentação/Grupo 3 - Status Report 16-09.pptx
@@ -23590,7 +23590,7 @@
                 <a:latin typeface="Calibri" panose="020F0502020204030204" pitchFamily="34" charset="0"/>
                 <a:cs typeface="Simplon BP Regular"/>
               </a:rPr>
-              <a:t>Começar a criaçao das telas</a:t>
+              <a:t>Começar a criaçao das telas:</a:t>
             </a:r>
           </a:p>
           <a:p>
@@ -23702,7 +23702,7 @@
                 <a:latin typeface="Calibri" panose="020F0502020204030204" pitchFamily="34" charset="0"/>
                 <a:cs typeface="Simplon BP Regular"/>
               </a:rPr>
-              <a:t>Padrões de negocio</a:t>
+              <a:t>Padrões de projeto</a:t>
             </a:r>
           </a:p>
           <a:p>

</xml_diff>